<commit_message>
updates after KY DoDN
</commit_message>
<xml_diff>
--- a/Presentations/FromZeroToXAML/FromZero.pptx
+++ b/Presentations/FromZeroToXAML/FromZero.pptx
@@ -288,7 +288,8 @@
           <a:p>
             <a:fld id="{3541C51D-28AE-4E03-B530-D8520D9050CD}" type="datetimeFigureOut">
               <a:rPr lang="en-US" smtClean="0"/>
-              <a:t>3/27/2008</a:t>
+              <a:pPr/>
+              <a:t>9/6/2008</a:t>
             </a:fld>
             <a:endParaRPr lang="en-US"/>
           </a:p>
@@ -330,6 +331,7 @@
           <a:p>
             <a:fld id="{D46C1CA3-265F-4F34-8D76-ED90F5957E1B}" type="slidenum">
               <a:rPr lang="en-US" smtClean="0"/>
+              <a:pPr/>
               <a:t>‹#›</a:t>
             </a:fld>
             <a:endParaRPr lang="en-US"/>
@@ -453,7 +455,8 @@
           <a:p>
             <a:fld id="{3541C51D-28AE-4E03-B530-D8520D9050CD}" type="datetimeFigureOut">
               <a:rPr lang="en-US" smtClean="0"/>
-              <a:t>3/27/2008</a:t>
+              <a:pPr/>
+              <a:t>9/6/2008</a:t>
             </a:fld>
             <a:endParaRPr lang="en-US"/>
           </a:p>
@@ -495,6 +498,7 @@
           <a:p>
             <a:fld id="{D46C1CA3-265F-4F34-8D76-ED90F5957E1B}" type="slidenum">
               <a:rPr lang="en-US" smtClean="0"/>
+              <a:pPr/>
               <a:t>‹#›</a:t>
             </a:fld>
             <a:endParaRPr lang="en-US"/>
@@ -628,7 +632,8 @@
           <a:p>
             <a:fld id="{3541C51D-28AE-4E03-B530-D8520D9050CD}" type="datetimeFigureOut">
               <a:rPr lang="en-US" smtClean="0"/>
-              <a:t>3/27/2008</a:t>
+              <a:pPr/>
+              <a:t>9/6/2008</a:t>
             </a:fld>
             <a:endParaRPr lang="en-US"/>
           </a:p>
@@ -670,6 +675,7 @@
           <a:p>
             <a:fld id="{D46C1CA3-265F-4F34-8D76-ED90F5957E1B}" type="slidenum">
               <a:rPr lang="en-US" smtClean="0"/>
+              <a:pPr/>
               <a:t>‹#›</a:t>
             </a:fld>
             <a:endParaRPr lang="en-US"/>
@@ -793,7 +799,8 @@
           <a:p>
             <a:fld id="{3541C51D-28AE-4E03-B530-D8520D9050CD}" type="datetimeFigureOut">
               <a:rPr lang="en-US" smtClean="0"/>
-              <a:t>3/27/2008</a:t>
+              <a:pPr/>
+              <a:t>9/6/2008</a:t>
             </a:fld>
             <a:endParaRPr lang="en-US"/>
           </a:p>
@@ -835,6 +842,7 @@
           <a:p>
             <a:fld id="{D46C1CA3-265F-4F34-8D76-ED90F5957E1B}" type="slidenum">
               <a:rPr lang="en-US" smtClean="0"/>
+              <a:pPr/>
               <a:t>‹#›</a:t>
             </a:fld>
             <a:endParaRPr lang="en-US"/>
@@ -1034,7 +1042,8 @@
           <a:p>
             <a:fld id="{3541C51D-28AE-4E03-B530-D8520D9050CD}" type="datetimeFigureOut">
               <a:rPr lang="en-US" smtClean="0"/>
-              <a:t>3/27/2008</a:t>
+              <a:pPr/>
+              <a:t>9/6/2008</a:t>
             </a:fld>
             <a:endParaRPr lang="en-US"/>
           </a:p>
@@ -1076,6 +1085,7 @@
           <a:p>
             <a:fld id="{D46C1CA3-265F-4F34-8D76-ED90F5957E1B}" type="slidenum">
               <a:rPr lang="en-US" smtClean="0"/>
+              <a:pPr/>
               <a:t>‹#›</a:t>
             </a:fld>
             <a:endParaRPr lang="en-US"/>
@@ -1317,7 +1327,8 @@
           <a:p>
             <a:fld id="{3541C51D-28AE-4E03-B530-D8520D9050CD}" type="datetimeFigureOut">
               <a:rPr lang="en-US" smtClean="0"/>
-              <a:t>3/27/2008</a:t>
+              <a:pPr/>
+              <a:t>9/6/2008</a:t>
             </a:fld>
             <a:endParaRPr lang="en-US"/>
           </a:p>
@@ -1359,6 +1370,7 @@
           <a:p>
             <a:fld id="{D46C1CA3-265F-4F34-8D76-ED90F5957E1B}" type="slidenum">
               <a:rPr lang="en-US" smtClean="0"/>
+              <a:pPr/>
               <a:t>‹#›</a:t>
             </a:fld>
             <a:endParaRPr lang="en-US"/>
@@ -1734,7 +1746,8 @@
           <a:p>
             <a:fld id="{3541C51D-28AE-4E03-B530-D8520D9050CD}" type="datetimeFigureOut">
               <a:rPr lang="en-US" smtClean="0"/>
-              <a:t>3/27/2008</a:t>
+              <a:pPr/>
+              <a:t>9/6/2008</a:t>
             </a:fld>
             <a:endParaRPr lang="en-US"/>
           </a:p>
@@ -1776,6 +1789,7 @@
           <a:p>
             <a:fld id="{D46C1CA3-265F-4F34-8D76-ED90F5957E1B}" type="slidenum">
               <a:rPr lang="en-US" smtClean="0"/>
+              <a:pPr/>
               <a:t>‹#›</a:t>
             </a:fld>
             <a:endParaRPr lang="en-US"/>
@@ -1847,7 +1861,8 @@
           <a:p>
             <a:fld id="{3541C51D-28AE-4E03-B530-D8520D9050CD}" type="datetimeFigureOut">
               <a:rPr lang="en-US" smtClean="0"/>
-              <a:t>3/27/2008</a:t>
+              <a:pPr/>
+              <a:t>9/6/2008</a:t>
             </a:fld>
             <a:endParaRPr lang="en-US"/>
           </a:p>
@@ -1889,6 +1904,7 @@
           <a:p>
             <a:fld id="{D46C1CA3-265F-4F34-8D76-ED90F5957E1B}" type="slidenum">
               <a:rPr lang="en-US" smtClean="0"/>
+              <a:pPr/>
               <a:t>‹#›</a:t>
             </a:fld>
             <a:endParaRPr lang="en-US"/>
@@ -1937,7 +1953,8 @@
           <a:p>
             <a:fld id="{3541C51D-28AE-4E03-B530-D8520D9050CD}" type="datetimeFigureOut">
               <a:rPr lang="en-US" smtClean="0"/>
-              <a:t>3/27/2008</a:t>
+              <a:pPr/>
+              <a:t>9/6/2008</a:t>
             </a:fld>
             <a:endParaRPr lang="en-US"/>
           </a:p>
@@ -1979,6 +1996,7 @@
           <a:p>
             <a:fld id="{D46C1CA3-265F-4F34-8D76-ED90F5957E1B}" type="slidenum">
               <a:rPr lang="en-US" smtClean="0"/>
+              <a:pPr/>
               <a:t>‹#›</a:t>
             </a:fld>
             <a:endParaRPr lang="en-US"/>
@@ -2209,7 +2227,8 @@
           <a:p>
             <a:fld id="{3541C51D-28AE-4E03-B530-D8520D9050CD}" type="datetimeFigureOut">
               <a:rPr lang="en-US" smtClean="0"/>
-              <a:t>3/27/2008</a:t>
+              <a:pPr/>
+              <a:t>9/6/2008</a:t>
             </a:fld>
             <a:endParaRPr lang="en-US"/>
           </a:p>
@@ -2251,6 +2270,7 @@
           <a:p>
             <a:fld id="{D46C1CA3-265F-4F34-8D76-ED90F5957E1B}" type="slidenum">
               <a:rPr lang="en-US" smtClean="0"/>
+              <a:pPr/>
               <a:t>‹#›</a:t>
             </a:fld>
             <a:endParaRPr lang="en-US"/>
@@ -2457,7 +2477,8 @@
           <a:p>
             <a:fld id="{3541C51D-28AE-4E03-B530-D8520D9050CD}" type="datetimeFigureOut">
               <a:rPr lang="en-US" smtClean="0"/>
-              <a:t>3/27/2008</a:t>
+              <a:pPr/>
+              <a:t>9/6/2008</a:t>
             </a:fld>
             <a:endParaRPr lang="en-US"/>
           </a:p>
@@ -2499,6 +2520,7 @@
           <a:p>
             <a:fld id="{D46C1CA3-265F-4F34-8D76-ED90F5957E1B}" type="slidenum">
               <a:rPr lang="en-US" smtClean="0"/>
+              <a:pPr/>
               <a:t>‹#›</a:t>
             </a:fld>
             <a:endParaRPr lang="en-US"/>
@@ -2665,7 +2687,8 @@
           <a:p>
             <a:fld id="{3541C51D-28AE-4E03-B530-D8520D9050CD}" type="datetimeFigureOut">
               <a:rPr lang="en-US" smtClean="0"/>
-              <a:t>3/27/2008</a:t>
+              <a:pPr/>
+              <a:t>9/6/2008</a:t>
             </a:fld>
             <a:endParaRPr lang="en-US"/>
           </a:p>
@@ -2743,6 +2766,7 @@
           <a:p>
             <a:fld id="{D46C1CA3-265F-4F34-8D76-ED90F5957E1B}" type="slidenum">
               <a:rPr lang="en-US" smtClean="0"/>
+              <a:pPr/>
               <a:t>‹#›</a:t>
             </a:fld>
             <a:endParaRPr lang="en-US"/>
@@ -3161,8 +3185,8 @@
         </p:nvSpPr>
         <p:spPr>
           <a:xfrm>
-            <a:off x="1710928" y="4191000"/>
-            <a:ext cx="5722144" cy="2154436"/>
+            <a:off x="863223" y="3962400"/>
+            <a:ext cx="7366377" cy="2769989"/>
           </a:xfrm>
           <a:prstGeom prst="rect">
             <a:avLst/>
@@ -3288,7 +3312,64 @@
                   </a:innerShdw>
                 </a:effectLst>
               </a:rPr>
-              <a:t>http://www.vinull.com</a:t>
+              <a:t>http://</a:t>
+            </a:r>
+            <a:r>
+              <a:rPr lang="en-US" sz="4000" b="1" cap="none" spc="50" dirty="0" smtClean="0">
+                <a:ln w="13500">
+                  <a:solidFill>
+                    <a:schemeClr val="accent1">
+                      <a:shade val="2500"/>
+                      <a:alpha val="6500"/>
+                    </a:schemeClr>
+                  </a:solidFill>
+                  <a:prstDash val="solid"/>
+                </a:ln>
+                <a:solidFill>
+                  <a:schemeClr val="accent1">
+                    <a:tint val="3000"/>
+                    <a:alpha val="95000"/>
+                  </a:schemeClr>
+                </a:solidFill>
+                <a:effectLst>
+                  <a:innerShdw blurRad="50900" dist="38500" dir="13500000">
+                    <a:srgbClr val="000000">
+                      <a:alpha val="60000"/>
+                    </a:srgbClr>
+                  </a:innerShdw>
+                </a:effectLst>
+              </a:rPr>
+              <a:t>www.vinull.com</a:t>
+            </a:r>
+          </a:p>
+          <a:p>
+            <a:pPr algn="ctr"/>
+            <a:r>
+              <a:rPr lang="en-US" sz="4000" b="1" spc="50" dirty="0" smtClean="0">
+                <a:ln w="13500">
+                  <a:solidFill>
+                    <a:schemeClr val="accent1">
+                      <a:shade val="2500"/>
+                      <a:alpha val="6500"/>
+                    </a:schemeClr>
+                  </a:solidFill>
+                  <a:prstDash val="solid"/>
+                </a:ln>
+                <a:solidFill>
+                  <a:schemeClr val="accent1">
+                    <a:tint val="3000"/>
+                    <a:alpha val="95000"/>
+                  </a:schemeClr>
+                </a:solidFill>
+                <a:effectLst>
+                  <a:innerShdw blurRad="50900" dist="38500" dir="13500000">
+                    <a:srgbClr val="000000">
+                      <a:alpha val="60000"/>
+                    </a:srgbClr>
+                  </a:innerShdw>
+                </a:effectLst>
+              </a:rPr>
+              <a:t>http://code.google.com/p/vinull</a:t>
             </a:r>
             <a:endParaRPr lang="en-US" sz="4000" b="1" cap="none" spc="50" dirty="0">
               <a:ln w="13500">
@@ -3322,6 +3403,13 @@
   <p:clrMapOvr>
     <a:masterClrMapping/>
   </p:clrMapOvr>
+  <p:timing>
+    <p:tnLst>
+      <p:par>
+        <p:cTn id="1" dur="indefinite" restart="never" nodeType="tmRoot"/>
+      </p:par>
+    </p:tnLst>
+  </p:timing>
 </p:sld>
 </file>
 

</xml_diff>